<commit_message>
Refactor font size retrieval logic in PortionFontSize class for improved clarity and maintainability; streamline methods for getting font size from various sources
</commit_message>
<xml_diff>
--- a/tests/ShapeCrawler.DevTests/Assets/019.pptx
+++ b/tests/ShapeCrawler.DevTests/Assets/019.pptx
@@ -1,6 +1,6 @@
 
 <file path=ppt/presentation.xml><?xml version="1.0" encoding="utf-8"?>
-<p:presentation xmlns:a="http://schemas.openxmlformats.org/drawingml/2006/main" xmlns:r="http://schemas.openxmlformats.org/officeDocument/2006/relationships" xmlns:p="http://schemas.openxmlformats.org/presentationml/2006/main" removePersonalInfoOnSave="1" saveSubsetFonts="1">
+<p:presentation xmlns:a="http://schemas.openxmlformats.org/drawingml/2006/main" xmlns:r="http://schemas.openxmlformats.org/officeDocument/2006/relationships" xmlns:p="http://schemas.openxmlformats.org/presentationml/2006/main" saveSubsetFonts="1">
   <p:sldMasterIdLst>
     <p:sldMasterId id="2147483648" r:id="rId1"/>
   </p:sldMasterIdLst>
@@ -230,7 +230,7 @@
               <a:cs typeface="+mn-cs"/>
             </a:defRPr>
           </a:pPr>
-          <a:endParaRPr lang="en-US"/>
+          <a:endParaRPr lang="ru-RU"/>
         </a:p>
       </c:txPr>
     </c:title>
@@ -1130,7 +1130,7 @@
               <a:pPr>
                 <a:defRPr/>
               </a:pPr>
-              <a:t>23.04.2023</a:t>
+              <a:t>25.05.2025</a:t>
             </a:fld>
             <a:endParaRPr lang="ru-RU"/>
           </a:p>
@@ -2058,7 +2058,7 @@
             </a:pPr>
             <a:fld id="{A27C6C47-F513-4D05-B98E-F3D5B37328A0}" type="datetime1">
               <a:rPr lang="ru-RU" smtClean="0"/>
-              <a:t>23.04.2023</a:t>
+              <a:t>25.05.2025</a:t>
             </a:fld>
             <a:endParaRPr lang="ru-RU"/>
           </a:p>
@@ -2418,7 +2418,7 @@
             </a:pPr>
             <a:fld id="{D682EB45-AA6E-47D4-81C6-B0F5BB9DBA22}" type="datetime1">
               <a:rPr lang="ru-RU" smtClean="0"/>
-              <a:t>23.04.2023</a:t>
+              <a:t>25.05.2025</a:t>
             </a:fld>
             <a:endParaRPr lang="ru-RU"/>
           </a:p>
@@ -3034,7 +3034,7 @@
       </p:graphicFrame>
       <p:sp>
         <p:nvSpPr>
-          <p:cNvPr id="2" name="Номер слайда 1">
+          <p:cNvPr id="2" name="Slide Number">
             <a:extLst>
               <a:ext uri="{FF2B5EF4-FFF2-40B4-BE49-F238E27FC236}">
                 <a16:creationId xmlns:a16="http://schemas.microsoft.com/office/drawing/2014/main" id="{A8E9DBEB-C824-44F8-A441-8D5639F5D2EE}"/>

</xml_diff>